<commit_message>
added data warehouse slide
</commit_message>
<xml_diff>
--- a/Slides/Cloud Computing Fundamentals.pptx
+++ b/Slides/Cloud Computing Fundamentals.pptx
@@ -116,6 +116,11 @@
       </a:defRPr>
     </a:lvl9pPr>
   </p:defaultTextStyle>
+  <p:extLst>
+    <p:ext uri="{EFAFB233-063F-42B5-8137-9DF3F51BA10A}">
+      <p15:sldGuideLst xmlns:p15="http://schemas.microsoft.com/office/powerpoint/2012/main"/>
+    </p:ext>
+  </p:extLst>
 </p:presentation>
 </file>
 
@@ -268,7 +273,7 @@
           <a:p>
             <a:fld id="{433EF8DA-81C9-48DB-9C1B-70F314538A8A}" type="datetimeFigureOut">
               <a:rPr lang="en-IN" smtClean="0"/>
-              <a:t>15-09-2022</a:t>
+              <a:t>16-09-2022</a:t>
             </a:fld>
             <a:endParaRPr lang="en-IN"/>
           </a:p>
@@ -468,7 +473,7 @@
           <a:p>
             <a:fld id="{433EF8DA-81C9-48DB-9C1B-70F314538A8A}" type="datetimeFigureOut">
               <a:rPr lang="en-IN" smtClean="0"/>
-              <a:t>15-09-2022</a:t>
+              <a:t>16-09-2022</a:t>
             </a:fld>
             <a:endParaRPr lang="en-IN"/>
           </a:p>
@@ -678,7 +683,7 @@
           <a:p>
             <a:fld id="{433EF8DA-81C9-48DB-9C1B-70F314538A8A}" type="datetimeFigureOut">
               <a:rPr lang="en-IN" smtClean="0"/>
-              <a:t>15-09-2022</a:t>
+              <a:t>16-09-2022</a:t>
             </a:fld>
             <a:endParaRPr lang="en-IN"/>
           </a:p>
@@ -878,7 +883,7 @@
           <a:p>
             <a:fld id="{433EF8DA-81C9-48DB-9C1B-70F314538A8A}" type="datetimeFigureOut">
               <a:rPr lang="en-IN" smtClean="0"/>
-              <a:t>15-09-2022</a:t>
+              <a:t>16-09-2022</a:t>
             </a:fld>
             <a:endParaRPr lang="en-IN"/>
           </a:p>
@@ -1154,7 +1159,7 @@
           <a:p>
             <a:fld id="{433EF8DA-81C9-48DB-9C1B-70F314538A8A}" type="datetimeFigureOut">
               <a:rPr lang="en-IN" smtClean="0"/>
-              <a:t>15-09-2022</a:t>
+              <a:t>16-09-2022</a:t>
             </a:fld>
             <a:endParaRPr lang="en-IN"/>
           </a:p>
@@ -1422,7 +1427,7 @@
           <a:p>
             <a:fld id="{433EF8DA-81C9-48DB-9C1B-70F314538A8A}" type="datetimeFigureOut">
               <a:rPr lang="en-IN" smtClean="0"/>
-              <a:t>15-09-2022</a:t>
+              <a:t>16-09-2022</a:t>
             </a:fld>
             <a:endParaRPr lang="en-IN"/>
           </a:p>
@@ -1837,7 +1842,7 @@
           <a:p>
             <a:fld id="{433EF8DA-81C9-48DB-9C1B-70F314538A8A}" type="datetimeFigureOut">
               <a:rPr lang="en-IN" smtClean="0"/>
-              <a:t>15-09-2022</a:t>
+              <a:t>16-09-2022</a:t>
             </a:fld>
             <a:endParaRPr lang="en-IN"/>
           </a:p>
@@ -1979,7 +1984,7 @@
           <a:p>
             <a:fld id="{433EF8DA-81C9-48DB-9C1B-70F314538A8A}" type="datetimeFigureOut">
               <a:rPr lang="en-IN" smtClean="0"/>
-              <a:t>15-09-2022</a:t>
+              <a:t>16-09-2022</a:t>
             </a:fld>
             <a:endParaRPr lang="en-IN"/>
           </a:p>
@@ -2092,7 +2097,7 @@
           <a:p>
             <a:fld id="{433EF8DA-81C9-48DB-9C1B-70F314538A8A}" type="datetimeFigureOut">
               <a:rPr lang="en-IN" smtClean="0"/>
-              <a:t>15-09-2022</a:t>
+              <a:t>16-09-2022</a:t>
             </a:fld>
             <a:endParaRPr lang="en-IN"/>
           </a:p>
@@ -2405,7 +2410,7 @@
           <a:p>
             <a:fld id="{433EF8DA-81C9-48DB-9C1B-70F314538A8A}" type="datetimeFigureOut">
               <a:rPr lang="en-IN" smtClean="0"/>
-              <a:t>15-09-2022</a:t>
+              <a:t>16-09-2022</a:t>
             </a:fld>
             <a:endParaRPr lang="en-IN"/>
           </a:p>
@@ -2694,7 +2699,7 @@
           <a:p>
             <a:fld id="{433EF8DA-81C9-48DB-9C1B-70F314538A8A}" type="datetimeFigureOut">
               <a:rPr lang="en-IN" smtClean="0"/>
-              <a:t>15-09-2022</a:t>
+              <a:t>16-09-2022</a:t>
             </a:fld>
             <a:endParaRPr lang="en-IN"/>
           </a:p>
@@ -2937,7 +2942,7 @@
           <a:p>
             <a:fld id="{433EF8DA-81C9-48DB-9C1B-70F314538A8A}" type="datetimeFigureOut">
               <a:rPr lang="en-IN" smtClean="0"/>
-              <a:t>15-09-2022</a:t>
+              <a:t>16-09-2022</a:t>
             </a:fld>
             <a:endParaRPr lang="en-IN"/>
           </a:p>

</xml_diff>